<commit_message>
minor fix to presentation
</commit_message>
<xml_diff>
--- a/Baseball is a Team Game.pptx
+++ b/Baseball is a Team Game.pptx
@@ -107,6 +107,11 @@
       </a:defRPr>
     </a:lvl9pPr>
   </p:defaultTextStyle>
+  <p:extLst>
+    <p:ext uri="{EFAFB233-063F-42B5-8137-9DF3F51BA10A}">
+      <p15:sldGuideLst xmlns:p15="http://schemas.microsoft.com/office/powerpoint/2012/main"/>
+    </p:ext>
+  </p:extLst>
 </p:presentation>
 </file>
 
@@ -856,7 +861,7 @@
             <a:fld id="{B61BEF0D-F0BB-DE4B-95CE-6DB70DBA9567}" type="datetimeFigureOut">
               <a:rPr lang="en-US" dirty="0"/>
               <a:pPr/>
-              <a:t>5/2/2016</a:t>
+              <a:t>5/4/2016</a:t>
             </a:fld>
             <a:endParaRPr lang="en-US" dirty="0"/>
           </a:p>
@@ -1104,7 +1109,7 @@
             <a:fld id="{B61BEF0D-F0BB-DE4B-95CE-6DB70DBA9567}" type="datetimeFigureOut">
               <a:rPr lang="en-US" dirty="0"/>
               <a:pPr/>
-              <a:t>5/2/2016</a:t>
+              <a:t>5/4/2016</a:t>
             </a:fld>
             <a:endParaRPr lang="en-US" dirty="0"/>
           </a:p>
@@ -1415,7 +1420,7 @@
             <a:fld id="{B61BEF0D-F0BB-DE4B-95CE-6DB70DBA9567}" type="datetimeFigureOut">
               <a:rPr lang="en-US" dirty="0"/>
               <a:pPr/>
-              <a:t>5/2/2016</a:t>
+              <a:t>5/4/2016</a:t>
             </a:fld>
             <a:endParaRPr lang="en-US" dirty="0"/>
           </a:p>
@@ -1745,7 +1750,7 @@
             <a:fld id="{B61BEF0D-F0BB-DE4B-95CE-6DB70DBA9567}" type="datetimeFigureOut">
               <a:rPr lang="en-US" dirty="0"/>
               <a:pPr/>
-              <a:t>5/2/2016</a:t>
+              <a:t>5/4/2016</a:t>
             </a:fld>
             <a:endParaRPr lang="en-US" dirty="0"/>
           </a:p>
@@ -2056,7 +2061,7 @@
             <a:fld id="{B61BEF0D-F0BB-DE4B-95CE-6DB70DBA9567}" type="datetimeFigureOut">
               <a:rPr lang="en-US" dirty="0"/>
               <a:pPr/>
-              <a:t>5/2/2016</a:t>
+              <a:t>5/4/2016</a:t>
             </a:fld>
             <a:endParaRPr lang="en-US" dirty="0"/>
           </a:p>
@@ -2446,7 +2451,7 @@
             <a:fld id="{B61BEF0D-F0BB-DE4B-95CE-6DB70DBA9567}" type="datetimeFigureOut">
               <a:rPr lang="en-US" dirty="0"/>
               <a:pPr/>
-              <a:t>5/2/2016</a:t>
+              <a:t>5/4/2016</a:t>
             </a:fld>
             <a:endParaRPr lang="en-US" dirty="0"/>
           </a:p>
@@ -2612,7 +2617,7 @@
           <a:p>
             <a:fld id="{55C6B4A9-1611-4792-9094-5F34BCA07E0B}" type="datetimeFigureOut">
               <a:rPr lang="en-US" dirty="0"/>
-              <a:t>5/2/2016</a:t>
+              <a:t>5/4/2016</a:t>
             </a:fld>
             <a:endParaRPr lang="en-US" dirty="0"/>
           </a:p>
@@ -2788,7 +2793,7 @@
             <a:fld id="{B61BEF0D-F0BB-DE4B-95CE-6DB70DBA9567}" type="datetimeFigureOut">
               <a:rPr lang="en-US" dirty="0"/>
               <a:pPr/>
-              <a:t>5/2/2016</a:t>
+              <a:t>5/4/2016</a:t>
             </a:fld>
             <a:endParaRPr lang="en-US" dirty="0"/>
           </a:p>
@@ -2954,7 +2959,7 @@
           <a:p>
             <a:fld id="{42A54C80-263E-416B-A8E0-580EDEADCBDC}" type="datetimeFigureOut">
               <a:rPr lang="en-US" dirty="0"/>
-              <a:t>5/2/2016</a:t>
+              <a:t>5/4/2016</a:t>
             </a:fld>
             <a:endParaRPr lang="en-US" dirty="0"/>
           </a:p>
@@ -3197,7 +3202,7 @@
             <a:fld id="{B61BEF0D-F0BB-DE4B-95CE-6DB70DBA9567}" type="datetimeFigureOut">
               <a:rPr lang="en-US" dirty="0"/>
               <a:pPr/>
-              <a:t>5/2/2016</a:t>
+              <a:t>5/4/2016</a:t>
             </a:fld>
             <a:endParaRPr lang="en-US" dirty="0"/>
           </a:p>
@@ -3425,7 +3430,7 @@
           <a:p>
             <a:fld id="{42A54C80-263E-416B-A8E0-580EDEADCBDC}" type="datetimeFigureOut">
               <a:rPr lang="en-US" dirty="0"/>
-              <a:t>5/2/2016</a:t>
+              <a:t>5/4/2016</a:t>
             </a:fld>
             <a:endParaRPr lang="en-US" dirty="0"/>
           </a:p>
@@ -3795,7 +3800,7 @@
             <a:fld id="{B61BEF0D-F0BB-DE4B-95CE-6DB70DBA9567}" type="datetimeFigureOut">
               <a:rPr lang="en-US" dirty="0"/>
               <a:pPr/>
-              <a:t>5/2/2016</a:t>
+              <a:t>5/4/2016</a:t>
             </a:fld>
             <a:endParaRPr lang="en-US" dirty="0"/>
           </a:p>
@@ -3915,7 +3920,7 @@
             <a:fld id="{B61BEF0D-F0BB-DE4B-95CE-6DB70DBA9567}" type="datetimeFigureOut">
               <a:rPr lang="en-US" dirty="0"/>
               <a:pPr/>
-              <a:t>5/2/2016</a:t>
+              <a:t>5/4/2016</a:t>
             </a:fld>
             <a:endParaRPr lang="en-US" dirty="0"/>
           </a:p>
@@ -4007,7 +4012,7 @@
             <a:fld id="{B61BEF0D-F0BB-DE4B-95CE-6DB70DBA9567}" type="datetimeFigureOut">
               <a:rPr lang="en-US" dirty="0"/>
               <a:pPr/>
-              <a:t>5/2/2016</a:t>
+              <a:t>5/4/2016</a:t>
             </a:fld>
             <a:endParaRPr lang="en-US" dirty="0"/>
           </a:p>
@@ -4258,7 +4263,7 @@
           <a:p>
             <a:fld id="{42A54C80-263E-416B-A8E0-580EDEADCBDC}" type="datetimeFigureOut">
               <a:rPr lang="en-US" dirty="0"/>
-              <a:t>5/2/2016</a:t>
+              <a:t>5/4/2016</a:t>
             </a:fld>
             <a:endParaRPr lang="en-US" dirty="0"/>
           </a:p>
@@ -4560,7 +4565,7 @@
             <a:fld id="{B61BEF0D-F0BB-DE4B-95CE-6DB70DBA9567}" type="datetimeFigureOut">
               <a:rPr lang="en-US" dirty="0"/>
               <a:pPr/>
-              <a:t>5/2/2016</a:t>
+              <a:t>5/4/2016</a:t>
             </a:fld>
             <a:endParaRPr lang="en-US" dirty="0"/>
           </a:p>
@@ -5258,7 +5263,7 @@
             <a:fld id="{B61BEF0D-F0BB-DE4B-95CE-6DB70DBA9567}" type="datetimeFigureOut">
               <a:rPr lang="en-US" dirty="0"/>
               <a:pPr/>
-              <a:t>5/2/2016</a:t>
+              <a:t>5/4/2016</a:t>
             </a:fld>
             <a:endParaRPr lang="en-US" dirty="0"/>
           </a:p>
@@ -6226,7 +6231,7 @@
         <p:spPr>
           <a:xfrm>
             <a:off x="920712" y="2197289"/>
-            <a:ext cx="6678431" cy="1754326"/>
+            <a:ext cx="8404865" cy="1754326"/>
           </a:xfrm>
           <a:prstGeom prst="rect">
             <a:avLst/>
@@ -6248,8 +6253,13 @@
             </a:pPr>
             <a:r>
               <a:rPr lang="en-US" sz="2400" dirty="0" smtClean="0"/>
-              <a:t>Bubble Graph – Payroll x Season Outcome x  </a:t>
-            </a:r>
+              <a:t>Bubble Graph – Payroll x Season Outcome </a:t>
+            </a:r>
+            <a:r>
+              <a:rPr lang="en-US" sz="2400" dirty="0" smtClean="0"/>
+              <a:t>x User Choice  </a:t>
+            </a:r>
+            <a:endParaRPr lang="en-US" sz="2400" dirty="0" smtClean="0"/>
           </a:p>
           <a:p>
             <a:pPr marL="342900" indent="-342900">

</xml_diff>